<commit_message>
updates to redis slides
</commit_message>
<xml_diff>
--- a/slides/Discussion1_Redis.pptx
+++ b/slides/Discussion1_Redis.pptx
@@ -4078,15 +4078,7 @@
           <a:p>
             <a:r>
               <a:rPr lang="en-US" dirty="0"/>
-              <a:t>Needs Linux/mac </a:t>
-            </a:r>
-            <a:r>
-              <a:rPr lang="en-US"/>
-              <a:t>or Ubuntu on </a:t>
-            </a:r>
-            <a:r>
-              <a:rPr lang="en-US" dirty="0"/>
-              <a:t>Windows (WSL)</a:t>
+              <a:t>Needs Linux/mac or Ubuntu on Windows (WSL)</a:t>
             </a:r>
           </a:p>
           <a:p>
@@ -4119,7 +4111,22 @@
               <a:rPr lang="en-US" dirty="0">
                 <a:latin typeface="Consolas" panose="020B0609020204030204" pitchFamily="49" charset="0"/>
               </a:rPr>
-              <a:t>-server start</a:t>
+              <a:t>-server start (OR)</a:t>
+            </a:r>
+          </a:p>
+          <a:p>
+            <a:pPr lvl="1"/>
+            <a:r>
+              <a:rPr lang="en-US" dirty="0" err="1">
+                <a:latin typeface="Consolas" panose="020B0609020204030204" pitchFamily="49" charset="0"/>
+              </a:rPr>
+              <a:t>redis</a:t>
+            </a:r>
+            <a:r>
+              <a:rPr lang="en-US" dirty="0">
+                <a:latin typeface="Consolas" panose="020B0609020204030204" pitchFamily="49" charset="0"/>
+              </a:rPr>
+              <a:t>-server</a:t>
             </a:r>
           </a:p>
           <a:p>
@@ -4556,7 +4563,7 @@
         <p:spPr/>
         <p:txBody>
           <a:bodyPr>
-            <a:normAutofit fontScale="92500" lnSpcReduction="20000"/>
+            <a:normAutofit lnSpcReduction="10000"/>
           </a:bodyPr>
           <a:lstStyle/>
           <a:p>
@@ -4640,12 +4647,6 @@
               <a:t>https://redis.io/docs/latest/commands/</a:t>
             </a:r>
             <a:endParaRPr lang="en-US" dirty="0"/>
-          </a:p>
-          <a:p>
-            <a:r>
-              <a:rPr lang="en-US" b="1" dirty="0"/>
-              <a:t>[DEMO]</a:t>
-            </a:r>
           </a:p>
           <a:p>
             <a:endParaRPr lang="en-US" dirty="0"/>
@@ -4798,13 +4799,8 @@
                 <a:latin typeface="Helvetica" panose="020B0604020202020204" pitchFamily="34" charset="0"/>
                 <a:cs typeface="Helvetica" panose="020B0604020202020204" pitchFamily="34" charset="0"/>
               </a:rPr>
-              <a:t>[DEMO]</a:t>
-            </a:r>
-          </a:p>
-          <a:p>
-            <a:pPr marL="0" indent="0">
-              <a:buNone/>
-            </a:pPr>
+              <a:t>Demo: https://github.com/davsec-teaching/jedis-demo</a:t>
+            </a:r>
             <a:endParaRPr lang="en-US" dirty="0"/>
           </a:p>
           <a:p>

</xml_diff>